<commit_message>
suppression of workspace ICSI and commit the rest of the files
</commit_message>
<xml_diff>
--- a/Presentation/ICSI_26112020.pptx
+++ b/Presentation/ICSI_26112020.pptx
@@ -204,7 +204,7 @@
           <a:p>
             <a:fld id="{51621F9A-F966-D047-9C6E-2E5FE7F52E36}" type="datetimeFigureOut">
               <a:rPr lang="fr-FR" smtClean="0"/>
-              <a:t>26/11/2020</a:t>
+              <a:t>23/03/2021</a:t>
             </a:fld>
             <a:endParaRPr lang="fr-FR"/>
           </a:p>
@@ -618,7 +618,7 @@
           <a:p>
             <a:fld id="{A4ACBD6C-B500-8C4E-A7A5-D3A68C05F62B}" type="datetime1">
               <a:rPr lang="fr-BE" smtClean="0"/>
-              <a:t>26/11/20</a:t>
+              <a:t>23/03/21</a:t>
             </a:fld>
             <a:endParaRPr lang="fr-FR"/>
           </a:p>
@@ -816,7 +816,7 @@
           <a:p>
             <a:fld id="{1A67D827-E874-D34B-8D63-35616BA76A25}" type="datetime1">
               <a:rPr lang="fr-BE" smtClean="0"/>
-              <a:t>26/11/20</a:t>
+              <a:t>23/03/21</a:t>
             </a:fld>
             <a:endParaRPr lang="fr-FR"/>
           </a:p>
@@ -1024,7 +1024,7 @@
           <a:p>
             <a:fld id="{2A8232D7-7291-2840-854F-164CC355A4E2}" type="datetime1">
               <a:rPr lang="fr-BE" smtClean="0"/>
-              <a:t>26/11/20</a:t>
+              <a:t>23/03/21</a:t>
             </a:fld>
             <a:endParaRPr lang="fr-FR"/>
           </a:p>
@@ -1222,7 +1222,7 @@
           <a:p>
             <a:fld id="{CAC320B1-85E2-9A44-B85F-803B6069A3BA}" type="datetime1">
               <a:rPr lang="fr-BE" smtClean="0"/>
-              <a:t>26/11/20</a:t>
+              <a:t>23/03/21</a:t>
             </a:fld>
             <a:endParaRPr lang="fr-FR"/>
           </a:p>
@@ -1497,7 +1497,7 @@
           <a:p>
             <a:fld id="{388DCB3F-D091-C142-96DB-2A7B061018FA}" type="datetime1">
               <a:rPr lang="fr-BE" smtClean="0"/>
-              <a:t>26/11/20</a:t>
+              <a:t>23/03/21</a:t>
             </a:fld>
             <a:endParaRPr lang="fr-FR"/>
           </a:p>
@@ -1762,7 +1762,7 @@
           <a:p>
             <a:fld id="{4B0D9C94-7832-3D46-93DD-487ED5A1DA82}" type="datetime1">
               <a:rPr lang="fr-BE" smtClean="0"/>
-              <a:t>26/11/20</a:t>
+              <a:t>23/03/21</a:t>
             </a:fld>
             <a:endParaRPr lang="fr-FR"/>
           </a:p>
@@ -2174,7 +2174,7 @@
           <a:p>
             <a:fld id="{E1BB9DB4-A681-9840-97BC-3735290F1CB4}" type="datetime1">
               <a:rPr lang="fr-BE" smtClean="0"/>
-              <a:t>26/11/20</a:t>
+              <a:t>23/03/21</a:t>
             </a:fld>
             <a:endParaRPr lang="fr-FR"/>
           </a:p>
@@ -2315,7 +2315,7 @@
           <a:p>
             <a:fld id="{0C2D5764-3538-9B4D-9348-E54F4AD1E2A9}" type="datetime1">
               <a:rPr lang="fr-BE" smtClean="0"/>
-              <a:t>26/11/20</a:t>
+              <a:t>23/03/21</a:t>
             </a:fld>
             <a:endParaRPr lang="fr-FR"/>
           </a:p>
@@ -2428,7 +2428,7 @@
           <a:p>
             <a:fld id="{43A5DC90-2FE3-B547-8869-4C4A7584C520}" type="datetime1">
               <a:rPr lang="fr-BE" smtClean="0"/>
-              <a:t>26/11/20</a:t>
+              <a:t>23/03/21</a:t>
             </a:fld>
             <a:endParaRPr lang="fr-FR"/>
           </a:p>
@@ -2739,7 +2739,7 @@
           <a:p>
             <a:fld id="{3049CD8D-8859-7E48-869F-3361CEA736B5}" type="datetime1">
               <a:rPr lang="fr-BE" smtClean="0"/>
-              <a:t>26/11/20</a:t>
+              <a:t>23/03/21</a:t>
             </a:fld>
             <a:endParaRPr lang="fr-FR"/>
           </a:p>
@@ -3027,7 +3027,7 @@
           <a:p>
             <a:fld id="{7E7C4A56-DF82-684D-ADE4-808ECDAE29BE}" type="datetime1">
               <a:rPr lang="fr-BE" smtClean="0"/>
-              <a:t>26/11/20</a:t>
+              <a:t>23/03/21</a:t>
             </a:fld>
             <a:endParaRPr lang="fr-FR"/>
           </a:p>
@@ -3268,7 +3268,7 @@
           <a:p>
             <a:fld id="{4C9C329C-E303-3D40-8BCA-33CAF5A4019E}" type="datetime1">
               <a:rPr lang="fr-BE" smtClean="0"/>
-              <a:t>26/11/20</a:t>
+              <a:t>23/03/21</a:t>
             </a:fld>
             <a:endParaRPr lang="fr-FR"/>
           </a:p>
@@ -3793,7 +3793,7 @@
           <a:p>
             <a:fld id="{0E8CF7F2-0330-D441-AC1E-CC43AC2766A0}" type="datetime1">
               <a:rPr lang="fr-BE" smtClean="0"/>
-              <a:t>26/11/20</a:t>
+              <a:t>23/03/21</a:t>
             </a:fld>
             <a:endParaRPr lang="fr-FR"/>
           </a:p>
@@ -4096,7 +4096,7 @@
           <a:p>
             <a:fld id="{CAC320B1-85E2-9A44-B85F-803B6069A3BA}" type="datetime1">
               <a:rPr lang="fr-BE" smtClean="0"/>
-              <a:t>26/11/20</a:t>
+              <a:t>23/03/21</a:t>
             </a:fld>
             <a:endParaRPr lang="fr-FR" dirty="0"/>
           </a:p>
@@ -4253,7 +4253,7 @@
           <a:p>
             <a:fld id="{CAC320B1-85E2-9A44-B85F-803B6069A3BA}" type="datetime1">
               <a:rPr lang="fr-BE" smtClean="0"/>
-              <a:t>26/11/20</a:t>
+              <a:t>23/03/21</a:t>
             </a:fld>
             <a:endParaRPr lang="fr-FR"/>
           </a:p>
@@ -5085,7 +5085,7 @@
           <a:p>
             <a:fld id="{CAC320B1-85E2-9A44-B85F-803B6069A3BA}" type="datetime1">
               <a:rPr lang="fr-BE" smtClean="0"/>
-              <a:t>26/11/20</a:t>
+              <a:t>23/03/21</a:t>
             </a:fld>
             <a:endParaRPr lang="fr-FR"/>
           </a:p>
@@ -5417,8 +5417,8 @@
           </p:spPr>
         </p:pic>
       </p:grpSp>
-      <mc:AlternateContent xmlns:mc="http://schemas.openxmlformats.org/markup-compatibility/2006">
-        <mc:Choice xmlns:a14="http://schemas.microsoft.com/office/drawing/2010/main" Requires="a14">
+      <mc:AlternateContent xmlns:mc="http://schemas.openxmlformats.org/markup-compatibility/2006" xmlns:a14="http://schemas.microsoft.com/office/drawing/2010/main">
+        <mc:Choice Requires="a14">
           <p:sp>
             <p:nvSpPr>
               <p:cNvPr id="11" name="ZoneTexte 10">
@@ -5536,7 +5536,7 @@
             </p:txBody>
           </p:sp>
         </mc:Choice>
-        <mc:Fallback>
+        <mc:Fallback xmlns="">
           <p:sp>
             <p:nvSpPr>
               <p:cNvPr id="11" name="ZoneTexte 10">
@@ -6111,7 +6111,7 @@
           <a:p>
             <a:fld id="{CAC320B1-85E2-9A44-B85F-803B6069A3BA}" type="datetime1">
               <a:rPr lang="fr-BE" smtClean="0"/>
-              <a:t>26/11/20</a:t>
+              <a:t>23/03/21</a:t>
             </a:fld>
             <a:endParaRPr lang="fr-FR"/>
           </a:p>
@@ -6215,8 +6215,8 @@
           </a:prstGeom>
         </p:spPr>
       </p:pic>
-      <mc:AlternateContent xmlns:mc="http://schemas.openxmlformats.org/markup-compatibility/2006">
-        <mc:Choice xmlns:a14="http://schemas.microsoft.com/office/drawing/2010/main" Requires="a14">
+      <mc:AlternateContent xmlns:mc="http://schemas.openxmlformats.org/markup-compatibility/2006" xmlns:a14="http://schemas.microsoft.com/office/drawing/2010/main">
+        <mc:Choice Requires="a14">
           <p:sp>
             <p:nvSpPr>
               <p:cNvPr id="12" name="ZoneTexte 11">
@@ -6291,7 +6291,7 @@
             </p:txBody>
           </p:sp>
         </mc:Choice>
-        <mc:Fallback>
+        <mc:Fallback xmlns="">
           <p:sp>
             <p:nvSpPr>
               <p:cNvPr id="12" name="ZoneTexte 11">
@@ -6641,8 +6641,8 @@
           </a:p>
         </p:txBody>
       </p:sp>
-      <mc:AlternateContent xmlns:mc="http://schemas.openxmlformats.org/markup-compatibility/2006">
-        <mc:Choice xmlns:a14="http://schemas.microsoft.com/office/drawing/2010/main" Requires="a14">
+      <mc:AlternateContent xmlns:mc="http://schemas.openxmlformats.org/markup-compatibility/2006" xmlns:a14="http://schemas.microsoft.com/office/drawing/2010/main">
+        <mc:Choice Requires="a14">
           <p:sp>
             <p:nvSpPr>
               <p:cNvPr id="30" name="ZoneTexte 29">
@@ -6718,7 +6718,7 @@
             </p:txBody>
           </p:sp>
         </mc:Choice>
-        <mc:Fallback>
+        <mc:Fallback xmlns="">
           <p:sp>
             <p:nvSpPr>
               <p:cNvPr id="30" name="ZoneTexte 29">
@@ -7492,7 +7492,7 @@
           <a:p>
             <a:fld id="{CAC320B1-85E2-9A44-B85F-803B6069A3BA}" type="datetime1">
               <a:rPr lang="fr-BE" smtClean="0"/>
-              <a:t>26/11/20</a:t>
+              <a:t>23/03/21</a:t>
             </a:fld>
             <a:endParaRPr lang="fr-FR"/>
           </a:p>
@@ -7584,7 +7584,7 @@
         </p:blipFill>
         <p:spPr>
           <a:xfrm>
-            <a:off x="299949" y="2728608"/>
+            <a:off x="299949" y="2635135"/>
             <a:ext cx="5223890" cy="3626778"/>
           </a:xfrm>
           <a:prstGeom prst="rect">
@@ -8417,7 +8417,7 @@
           <a:p>
             <a:fld id="{CAC320B1-85E2-9A44-B85F-803B6069A3BA}" type="datetime1">
               <a:rPr lang="fr-BE" smtClean="0"/>
-              <a:t>26/11/20</a:t>
+              <a:t>23/03/21</a:t>
             </a:fld>
             <a:endParaRPr lang="fr-FR"/>
           </a:p>
@@ -10254,7 +10254,7 @@
           <a:p>
             <a:fld id="{CAC320B1-85E2-9A44-B85F-803B6069A3BA}" type="datetime1">
               <a:rPr lang="fr-BE" smtClean="0"/>
-              <a:t>26/11/20</a:t>
+              <a:t>23/03/21</a:t>
             </a:fld>
             <a:endParaRPr lang="fr-FR"/>
           </a:p>

</xml_diff>